<commit_message>
Added MC setup pdf.
</commit_message>
<xml_diff>
--- a/Powerpoint/Astos Monte-Carlo Simulation Setup.pptx
+++ b/Powerpoint/Astos Monte-Carlo Simulation Setup.pptx
@@ -203,7 +203,7 @@
           <a:p>
             <a:fld id="{FA45067E-300B-4E15-9BE0-05D74479EF75}" type="datetimeFigureOut">
               <a:rPr lang="en-SG" smtClean="0"/>
-              <a:t>29/5/2023</a:t>
+              <a:t>8/11/2023</a:t>
             </a:fld>
             <a:endParaRPr lang="en-SG"/>
           </a:p>
@@ -1492,7 +1492,7 @@
           <a:p>
             <a:fld id="{8315323D-1CEB-48C3-81BC-5447BA34A716}" type="datetimeFigureOut">
               <a:rPr lang="en-SG" smtClean="0"/>
-              <a:t>29/5/2023</a:t>
+              <a:t>8/11/2023</a:t>
             </a:fld>
             <a:endParaRPr lang="en-SG"/>
           </a:p>
@@ -1662,7 +1662,7 @@
           <a:p>
             <a:fld id="{8315323D-1CEB-48C3-81BC-5447BA34A716}" type="datetimeFigureOut">
               <a:rPr lang="en-SG" smtClean="0"/>
-              <a:t>29/5/2023</a:t>
+              <a:t>8/11/2023</a:t>
             </a:fld>
             <a:endParaRPr lang="en-SG"/>
           </a:p>
@@ -1842,7 +1842,7 @@
           <a:p>
             <a:fld id="{8315323D-1CEB-48C3-81BC-5447BA34A716}" type="datetimeFigureOut">
               <a:rPr lang="en-SG" smtClean="0"/>
-              <a:t>29/5/2023</a:t>
+              <a:t>8/11/2023</a:t>
             </a:fld>
             <a:endParaRPr lang="en-SG"/>
           </a:p>
@@ -2012,7 +2012,7 @@
           <a:p>
             <a:fld id="{8315323D-1CEB-48C3-81BC-5447BA34A716}" type="datetimeFigureOut">
               <a:rPr lang="en-SG" smtClean="0"/>
-              <a:t>29/5/2023</a:t>
+              <a:t>8/11/2023</a:t>
             </a:fld>
             <a:endParaRPr lang="en-SG"/>
           </a:p>
@@ -2258,7 +2258,7 @@
           <a:p>
             <a:fld id="{8315323D-1CEB-48C3-81BC-5447BA34A716}" type="datetimeFigureOut">
               <a:rPr lang="en-SG" smtClean="0"/>
-              <a:t>29/5/2023</a:t>
+              <a:t>8/11/2023</a:t>
             </a:fld>
             <a:endParaRPr lang="en-SG"/>
           </a:p>
@@ -2546,7 +2546,7 @@
           <a:p>
             <a:fld id="{8315323D-1CEB-48C3-81BC-5447BA34A716}" type="datetimeFigureOut">
               <a:rPr lang="en-SG" smtClean="0"/>
-              <a:t>29/5/2023</a:t>
+              <a:t>8/11/2023</a:t>
             </a:fld>
             <a:endParaRPr lang="en-SG"/>
           </a:p>
@@ -2968,7 +2968,7 @@
           <a:p>
             <a:fld id="{8315323D-1CEB-48C3-81BC-5447BA34A716}" type="datetimeFigureOut">
               <a:rPr lang="en-SG" smtClean="0"/>
-              <a:t>29/5/2023</a:t>
+              <a:t>8/11/2023</a:t>
             </a:fld>
             <a:endParaRPr lang="en-SG"/>
           </a:p>
@@ -3086,7 +3086,7 @@
           <a:p>
             <a:fld id="{8315323D-1CEB-48C3-81BC-5447BA34A716}" type="datetimeFigureOut">
               <a:rPr lang="en-SG" smtClean="0"/>
-              <a:t>29/5/2023</a:t>
+              <a:t>8/11/2023</a:t>
             </a:fld>
             <a:endParaRPr lang="en-SG"/>
           </a:p>
@@ -3181,7 +3181,7 @@
           <a:p>
             <a:fld id="{8315323D-1CEB-48C3-81BC-5447BA34A716}" type="datetimeFigureOut">
               <a:rPr lang="en-SG" smtClean="0"/>
-              <a:t>29/5/2023</a:t>
+              <a:t>8/11/2023</a:t>
             </a:fld>
             <a:endParaRPr lang="en-SG"/>
           </a:p>
@@ -3458,7 +3458,7 @@
           <a:p>
             <a:fld id="{8315323D-1CEB-48C3-81BC-5447BA34A716}" type="datetimeFigureOut">
               <a:rPr lang="en-SG" smtClean="0"/>
-              <a:t>29/5/2023</a:t>
+              <a:t>8/11/2023</a:t>
             </a:fld>
             <a:endParaRPr lang="en-SG"/>
           </a:p>
@@ -3711,7 +3711,7 @@
           <a:p>
             <a:fld id="{8315323D-1CEB-48C3-81BC-5447BA34A716}" type="datetimeFigureOut">
               <a:rPr lang="en-SG" smtClean="0"/>
-              <a:t>29/5/2023</a:t>
+              <a:t>8/11/2023</a:t>
             </a:fld>
             <a:endParaRPr lang="en-SG"/>
           </a:p>
@@ -3924,7 +3924,7 @@
           <a:p>
             <a:fld id="{8315323D-1CEB-48C3-81BC-5447BA34A716}" type="datetimeFigureOut">
               <a:rPr lang="en-SG" smtClean="0"/>
-              <a:t>29/5/2023</a:t>
+              <a:t>8/11/2023</a:t>
             </a:fld>
             <a:endParaRPr lang="en-SG"/>
           </a:p>
@@ -4331,7 +4331,7 @@
           <p:cNvPr id="5" name="Picture 4" descr="A picture containing text&#10;&#10;Description automatically generated">
             <a:extLst>
               <a:ext uri="{FF2B5EF4-FFF2-40B4-BE49-F238E27FC236}">
-                <a16:creationId xmlns="" xmlns:a16="http://schemas.microsoft.com/office/drawing/2014/main" id="{42F39745-8242-CECD-0766-AB3020E26AAB}"/>
+                <a16:creationId xmlns:a16="http://schemas.microsoft.com/office/drawing/2014/main" xmlns="" id="{42F39745-8242-CECD-0766-AB3020E26AAB}"/>
               </a:ext>
             </a:extLst>
           </p:cNvPr>
@@ -4371,7 +4371,7 @@
         <p:spPr>
           <a:xfrm>
             <a:off x="1049147" y="2132856"/>
-            <a:ext cx="7112174" cy="2708434"/>
+            <a:ext cx="7112174" cy="2092881"/>
           </a:xfrm>
           <a:prstGeom prst="rect">
             <a:avLst/>
@@ -4394,7 +4394,11 @@
             <a:pPr algn="ctr"/>
             <a:r>
               <a:rPr lang="en-SG" sz="4000" b="1" dirty="0" smtClean="0"/>
-              <a:t>Simulation Setup and Post-Processing</a:t>
+              <a:t>Simulation </a:t>
+            </a:r>
+            <a:r>
+              <a:rPr lang="en-SG" sz="4000" b="1" dirty="0" smtClean="0"/>
+              <a:t>Setup</a:t>
             </a:r>
           </a:p>
           <a:p>
@@ -4446,7 +4450,7 @@
           <p:cNvPr id="4" name="Group 3">
             <a:extLst>
               <a:ext uri="{FF2B5EF4-FFF2-40B4-BE49-F238E27FC236}">
-                <a16:creationId xmlns="" xmlns:a16="http://schemas.microsoft.com/office/drawing/2014/main" id="{13F2DEE3-F449-38D9-9AB5-0EBC1EFBD438}"/>
+                <a16:creationId xmlns:a16="http://schemas.microsoft.com/office/drawing/2014/main" xmlns="" id="{13F2DEE3-F449-38D9-9AB5-0EBC1EFBD438}"/>
               </a:ext>
             </a:extLst>
           </p:cNvPr>
@@ -4466,7 +4470,7 @@
             <p:cNvPr id="5" name="Picture 4">
               <a:extLst>
                 <a:ext uri="{FF2B5EF4-FFF2-40B4-BE49-F238E27FC236}">
-                  <a16:creationId xmlns="" xmlns:a16="http://schemas.microsoft.com/office/drawing/2014/main" id="{20EE73A0-299D-4E7F-A490-9719C6AC5308}"/>
+                  <a16:creationId xmlns:a16="http://schemas.microsoft.com/office/drawing/2014/main" xmlns="" id="{20EE73A0-299D-4E7F-A490-9719C6AC5308}"/>
                 </a:ext>
               </a:extLst>
             </p:cNvPr>
@@ -4496,7 +4500,7 @@
             <p:cNvPr id="6" name="Picture 5" descr="A picture containing text&#10;&#10;Description automatically generated">
               <a:extLst>
                 <a:ext uri="{FF2B5EF4-FFF2-40B4-BE49-F238E27FC236}">
-                  <a16:creationId xmlns="" xmlns:a16="http://schemas.microsoft.com/office/drawing/2014/main" id="{1476F098-749B-4C07-EA3A-C8916E8D36A4}"/>
+                  <a16:creationId xmlns:a16="http://schemas.microsoft.com/office/drawing/2014/main" xmlns="" id="{1476F098-749B-4C07-EA3A-C8916E8D36A4}"/>
                 </a:ext>
               </a:extLst>
             </p:cNvPr>
@@ -5077,7 +5081,7 @@
           <p:cNvPr id="4" name="Group 3">
             <a:extLst>
               <a:ext uri="{FF2B5EF4-FFF2-40B4-BE49-F238E27FC236}">
-                <a16:creationId xmlns="" xmlns:a16="http://schemas.microsoft.com/office/drawing/2014/main" id="{13F2DEE3-F449-38D9-9AB5-0EBC1EFBD438}"/>
+                <a16:creationId xmlns:a16="http://schemas.microsoft.com/office/drawing/2014/main" xmlns="" id="{13F2DEE3-F449-38D9-9AB5-0EBC1EFBD438}"/>
               </a:ext>
             </a:extLst>
           </p:cNvPr>
@@ -5097,7 +5101,7 @@
             <p:cNvPr id="5" name="Picture 4">
               <a:extLst>
                 <a:ext uri="{FF2B5EF4-FFF2-40B4-BE49-F238E27FC236}">
-                  <a16:creationId xmlns="" xmlns:a16="http://schemas.microsoft.com/office/drawing/2014/main" id="{20EE73A0-299D-4E7F-A490-9719C6AC5308}"/>
+                  <a16:creationId xmlns:a16="http://schemas.microsoft.com/office/drawing/2014/main" xmlns="" id="{20EE73A0-299D-4E7F-A490-9719C6AC5308}"/>
                 </a:ext>
               </a:extLst>
             </p:cNvPr>
@@ -5127,7 +5131,7 @@
             <p:cNvPr id="6" name="Picture 5" descr="A picture containing text&#10;&#10;Description automatically generated">
               <a:extLst>
                 <a:ext uri="{FF2B5EF4-FFF2-40B4-BE49-F238E27FC236}">
-                  <a16:creationId xmlns="" xmlns:a16="http://schemas.microsoft.com/office/drawing/2014/main" id="{1476F098-749B-4C07-EA3A-C8916E8D36A4}"/>
+                  <a16:creationId xmlns:a16="http://schemas.microsoft.com/office/drawing/2014/main" xmlns="" id="{1476F098-749B-4C07-EA3A-C8916E8D36A4}"/>
                 </a:ext>
               </a:extLst>
             </p:cNvPr>
@@ -5605,7 +5609,7 @@
           <p:cNvPr id="4" name="Group 3">
             <a:extLst>
               <a:ext uri="{FF2B5EF4-FFF2-40B4-BE49-F238E27FC236}">
-                <a16:creationId xmlns="" xmlns:a16="http://schemas.microsoft.com/office/drawing/2014/main" id="{13F2DEE3-F449-38D9-9AB5-0EBC1EFBD438}"/>
+                <a16:creationId xmlns:a16="http://schemas.microsoft.com/office/drawing/2014/main" xmlns="" id="{13F2DEE3-F449-38D9-9AB5-0EBC1EFBD438}"/>
               </a:ext>
             </a:extLst>
           </p:cNvPr>
@@ -5625,7 +5629,7 @@
             <p:cNvPr id="5" name="Picture 4">
               <a:extLst>
                 <a:ext uri="{FF2B5EF4-FFF2-40B4-BE49-F238E27FC236}">
-                  <a16:creationId xmlns="" xmlns:a16="http://schemas.microsoft.com/office/drawing/2014/main" id="{20EE73A0-299D-4E7F-A490-9719C6AC5308}"/>
+                  <a16:creationId xmlns:a16="http://schemas.microsoft.com/office/drawing/2014/main" xmlns="" id="{20EE73A0-299D-4E7F-A490-9719C6AC5308}"/>
                 </a:ext>
               </a:extLst>
             </p:cNvPr>
@@ -5655,7 +5659,7 @@
             <p:cNvPr id="6" name="Picture 5" descr="A picture containing text&#10;&#10;Description automatically generated">
               <a:extLst>
                 <a:ext uri="{FF2B5EF4-FFF2-40B4-BE49-F238E27FC236}">
-                  <a16:creationId xmlns="" xmlns:a16="http://schemas.microsoft.com/office/drawing/2014/main" id="{1476F098-749B-4C07-EA3A-C8916E8D36A4}"/>
+                  <a16:creationId xmlns:a16="http://schemas.microsoft.com/office/drawing/2014/main" xmlns="" id="{1476F098-749B-4C07-EA3A-C8916E8D36A4}"/>
                 </a:ext>
               </a:extLst>
             </p:cNvPr>
@@ -6071,7 +6075,7 @@
           <p:cNvPr id="4" name="Group 3">
             <a:extLst>
               <a:ext uri="{FF2B5EF4-FFF2-40B4-BE49-F238E27FC236}">
-                <a16:creationId xmlns="" xmlns:a16="http://schemas.microsoft.com/office/drawing/2014/main" id="{13F2DEE3-F449-38D9-9AB5-0EBC1EFBD438}"/>
+                <a16:creationId xmlns:a16="http://schemas.microsoft.com/office/drawing/2014/main" xmlns="" id="{13F2DEE3-F449-38D9-9AB5-0EBC1EFBD438}"/>
               </a:ext>
             </a:extLst>
           </p:cNvPr>
@@ -6091,7 +6095,7 @@
             <p:cNvPr id="5" name="Picture 4">
               <a:extLst>
                 <a:ext uri="{FF2B5EF4-FFF2-40B4-BE49-F238E27FC236}">
-                  <a16:creationId xmlns="" xmlns:a16="http://schemas.microsoft.com/office/drawing/2014/main" id="{20EE73A0-299D-4E7F-A490-9719C6AC5308}"/>
+                  <a16:creationId xmlns:a16="http://schemas.microsoft.com/office/drawing/2014/main" xmlns="" id="{20EE73A0-299D-4E7F-A490-9719C6AC5308}"/>
                 </a:ext>
               </a:extLst>
             </p:cNvPr>
@@ -6121,7 +6125,7 @@
             <p:cNvPr id="6" name="Picture 5" descr="A picture containing text&#10;&#10;Description automatically generated">
               <a:extLst>
                 <a:ext uri="{FF2B5EF4-FFF2-40B4-BE49-F238E27FC236}">
-                  <a16:creationId xmlns="" xmlns:a16="http://schemas.microsoft.com/office/drawing/2014/main" id="{1476F098-749B-4C07-EA3A-C8916E8D36A4}"/>
+                  <a16:creationId xmlns:a16="http://schemas.microsoft.com/office/drawing/2014/main" xmlns="" id="{1476F098-749B-4C07-EA3A-C8916E8D36A4}"/>
                 </a:ext>
               </a:extLst>
             </p:cNvPr>
@@ -6296,7 +6300,7 @@
           <p:cNvPr id="4" name="Group 3">
             <a:extLst>
               <a:ext uri="{FF2B5EF4-FFF2-40B4-BE49-F238E27FC236}">
-                <a16:creationId xmlns="" xmlns:a16="http://schemas.microsoft.com/office/drawing/2014/main" id="{13F2DEE3-F449-38D9-9AB5-0EBC1EFBD438}"/>
+                <a16:creationId xmlns:a16="http://schemas.microsoft.com/office/drawing/2014/main" xmlns="" id="{13F2DEE3-F449-38D9-9AB5-0EBC1EFBD438}"/>
               </a:ext>
             </a:extLst>
           </p:cNvPr>
@@ -6316,7 +6320,7 @@
             <p:cNvPr id="5" name="Picture 4">
               <a:extLst>
                 <a:ext uri="{FF2B5EF4-FFF2-40B4-BE49-F238E27FC236}">
-                  <a16:creationId xmlns="" xmlns:a16="http://schemas.microsoft.com/office/drawing/2014/main" id="{20EE73A0-299D-4E7F-A490-9719C6AC5308}"/>
+                  <a16:creationId xmlns:a16="http://schemas.microsoft.com/office/drawing/2014/main" xmlns="" id="{20EE73A0-299D-4E7F-A490-9719C6AC5308}"/>
                 </a:ext>
               </a:extLst>
             </p:cNvPr>
@@ -6346,7 +6350,7 @@
             <p:cNvPr id="6" name="Picture 5" descr="A picture containing text&#10;&#10;Description automatically generated">
               <a:extLst>
                 <a:ext uri="{FF2B5EF4-FFF2-40B4-BE49-F238E27FC236}">
-                  <a16:creationId xmlns="" xmlns:a16="http://schemas.microsoft.com/office/drawing/2014/main" id="{1476F098-749B-4C07-EA3A-C8916E8D36A4}"/>
+                  <a16:creationId xmlns:a16="http://schemas.microsoft.com/office/drawing/2014/main" xmlns="" id="{1476F098-749B-4C07-EA3A-C8916E8D36A4}"/>
                 </a:ext>
               </a:extLst>
             </p:cNvPr>
@@ -6598,7 +6602,7 @@
           <p:cNvPr id="4" name="Group 3">
             <a:extLst>
               <a:ext uri="{FF2B5EF4-FFF2-40B4-BE49-F238E27FC236}">
-                <a16:creationId xmlns="" xmlns:a16="http://schemas.microsoft.com/office/drawing/2014/main" id="{13F2DEE3-F449-38D9-9AB5-0EBC1EFBD438}"/>
+                <a16:creationId xmlns:a16="http://schemas.microsoft.com/office/drawing/2014/main" xmlns="" id="{13F2DEE3-F449-38D9-9AB5-0EBC1EFBD438}"/>
               </a:ext>
             </a:extLst>
           </p:cNvPr>
@@ -6618,7 +6622,7 @@
             <p:cNvPr id="5" name="Picture 4">
               <a:extLst>
                 <a:ext uri="{FF2B5EF4-FFF2-40B4-BE49-F238E27FC236}">
-                  <a16:creationId xmlns="" xmlns:a16="http://schemas.microsoft.com/office/drawing/2014/main" id="{20EE73A0-299D-4E7F-A490-9719C6AC5308}"/>
+                  <a16:creationId xmlns:a16="http://schemas.microsoft.com/office/drawing/2014/main" xmlns="" id="{20EE73A0-299D-4E7F-A490-9719C6AC5308}"/>
                 </a:ext>
               </a:extLst>
             </p:cNvPr>
@@ -6648,7 +6652,7 @@
             <p:cNvPr id="6" name="Picture 5" descr="A picture containing text&#10;&#10;Description automatically generated">
               <a:extLst>
                 <a:ext uri="{FF2B5EF4-FFF2-40B4-BE49-F238E27FC236}">
-                  <a16:creationId xmlns="" xmlns:a16="http://schemas.microsoft.com/office/drawing/2014/main" id="{1476F098-749B-4C07-EA3A-C8916E8D36A4}"/>
+                  <a16:creationId xmlns:a16="http://schemas.microsoft.com/office/drawing/2014/main" xmlns="" id="{1476F098-749B-4C07-EA3A-C8916E8D36A4}"/>
                 </a:ext>
               </a:extLst>
             </p:cNvPr>
@@ -6901,7 +6905,7 @@
           <p:cNvPr id="4" name="Group 3">
             <a:extLst>
               <a:ext uri="{FF2B5EF4-FFF2-40B4-BE49-F238E27FC236}">
-                <a16:creationId xmlns="" xmlns:a16="http://schemas.microsoft.com/office/drawing/2014/main" id="{13F2DEE3-F449-38D9-9AB5-0EBC1EFBD438}"/>
+                <a16:creationId xmlns:a16="http://schemas.microsoft.com/office/drawing/2014/main" xmlns="" id="{13F2DEE3-F449-38D9-9AB5-0EBC1EFBD438}"/>
               </a:ext>
             </a:extLst>
           </p:cNvPr>
@@ -6921,7 +6925,7 @@
             <p:cNvPr id="5" name="Picture 4">
               <a:extLst>
                 <a:ext uri="{FF2B5EF4-FFF2-40B4-BE49-F238E27FC236}">
-                  <a16:creationId xmlns="" xmlns:a16="http://schemas.microsoft.com/office/drawing/2014/main" id="{20EE73A0-299D-4E7F-A490-9719C6AC5308}"/>
+                  <a16:creationId xmlns:a16="http://schemas.microsoft.com/office/drawing/2014/main" xmlns="" id="{20EE73A0-299D-4E7F-A490-9719C6AC5308}"/>
                 </a:ext>
               </a:extLst>
             </p:cNvPr>
@@ -6951,7 +6955,7 @@
             <p:cNvPr id="6" name="Picture 5" descr="A picture containing text&#10;&#10;Description automatically generated">
               <a:extLst>
                 <a:ext uri="{FF2B5EF4-FFF2-40B4-BE49-F238E27FC236}">
-                  <a16:creationId xmlns="" xmlns:a16="http://schemas.microsoft.com/office/drawing/2014/main" id="{1476F098-749B-4C07-EA3A-C8916E8D36A4}"/>
+                  <a16:creationId xmlns:a16="http://schemas.microsoft.com/office/drawing/2014/main" xmlns="" id="{1476F098-749B-4C07-EA3A-C8916E8D36A4}"/>
                 </a:ext>
               </a:extLst>
             </p:cNvPr>
@@ -7204,7 +7208,7 @@
           <p:cNvPr id="4" name="Group 3">
             <a:extLst>
               <a:ext uri="{FF2B5EF4-FFF2-40B4-BE49-F238E27FC236}">
-                <a16:creationId xmlns="" xmlns:a16="http://schemas.microsoft.com/office/drawing/2014/main" id="{13F2DEE3-F449-38D9-9AB5-0EBC1EFBD438}"/>
+                <a16:creationId xmlns:a16="http://schemas.microsoft.com/office/drawing/2014/main" xmlns="" id="{13F2DEE3-F449-38D9-9AB5-0EBC1EFBD438}"/>
               </a:ext>
             </a:extLst>
           </p:cNvPr>
@@ -7224,7 +7228,7 @@
             <p:cNvPr id="5" name="Picture 4">
               <a:extLst>
                 <a:ext uri="{FF2B5EF4-FFF2-40B4-BE49-F238E27FC236}">
-                  <a16:creationId xmlns="" xmlns:a16="http://schemas.microsoft.com/office/drawing/2014/main" id="{20EE73A0-299D-4E7F-A490-9719C6AC5308}"/>
+                  <a16:creationId xmlns:a16="http://schemas.microsoft.com/office/drawing/2014/main" xmlns="" id="{20EE73A0-299D-4E7F-A490-9719C6AC5308}"/>
                 </a:ext>
               </a:extLst>
             </p:cNvPr>
@@ -7254,7 +7258,7 @@
             <p:cNvPr id="6" name="Picture 5" descr="A picture containing text&#10;&#10;Description automatically generated">
               <a:extLst>
                 <a:ext uri="{FF2B5EF4-FFF2-40B4-BE49-F238E27FC236}">
-                  <a16:creationId xmlns="" xmlns:a16="http://schemas.microsoft.com/office/drawing/2014/main" id="{1476F098-749B-4C07-EA3A-C8916E8D36A4}"/>
+                  <a16:creationId xmlns:a16="http://schemas.microsoft.com/office/drawing/2014/main" xmlns="" id="{1476F098-749B-4C07-EA3A-C8916E8D36A4}"/>
                 </a:ext>
               </a:extLst>
             </p:cNvPr>
@@ -7792,7 +7796,7 @@
           <p:cNvPr id="4" name="Group 3">
             <a:extLst>
               <a:ext uri="{FF2B5EF4-FFF2-40B4-BE49-F238E27FC236}">
-                <a16:creationId xmlns="" xmlns:a16="http://schemas.microsoft.com/office/drawing/2014/main" id="{13F2DEE3-F449-38D9-9AB5-0EBC1EFBD438}"/>
+                <a16:creationId xmlns:a16="http://schemas.microsoft.com/office/drawing/2014/main" xmlns="" id="{13F2DEE3-F449-38D9-9AB5-0EBC1EFBD438}"/>
               </a:ext>
             </a:extLst>
           </p:cNvPr>
@@ -7812,7 +7816,7 @@
             <p:cNvPr id="5" name="Picture 4">
               <a:extLst>
                 <a:ext uri="{FF2B5EF4-FFF2-40B4-BE49-F238E27FC236}">
-                  <a16:creationId xmlns="" xmlns:a16="http://schemas.microsoft.com/office/drawing/2014/main" id="{20EE73A0-299D-4E7F-A490-9719C6AC5308}"/>
+                  <a16:creationId xmlns:a16="http://schemas.microsoft.com/office/drawing/2014/main" xmlns="" id="{20EE73A0-299D-4E7F-A490-9719C6AC5308}"/>
                 </a:ext>
               </a:extLst>
             </p:cNvPr>
@@ -7842,7 +7846,7 @@
             <p:cNvPr id="6" name="Picture 5" descr="A picture containing text&#10;&#10;Description automatically generated">
               <a:extLst>
                 <a:ext uri="{FF2B5EF4-FFF2-40B4-BE49-F238E27FC236}">
-                  <a16:creationId xmlns="" xmlns:a16="http://schemas.microsoft.com/office/drawing/2014/main" id="{1476F098-749B-4C07-EA3A-C8916E8D36A4}"/>
+                  <a16:creationId xmlns:a16="http://schemas.microsoft.com/office/drawing/2014/main" xmlns="" id="{1476F098-749B-4C07-EA3A-C8916E8D36A4}"/>
                 </a:ext>
               </a:extLst>
             </p:cNvPr>
@@ -8235,7 +8239,7 @@
           <p:cNvPr id="4" name="Group 3">
             <a:extLst>
               <a:ext uri="{FF2B5EF4-FFF2-40B4-BE49-F238E27FC236}">
-                <a16:creationId xmlns="" xmlns:a16="http://schemas.microsoft.com/office/drawing/2014/main" id="{13F2DEE3-F449-38D9-9AB5-0EBC1EFBD438}"/>
+                <a16:creationId xmlns:a16="http://schemas.microsoft.com/office/drawing/2014/main" xmlns="" id="{13F2DEE3-F449-38D9-9AB5-0EBC1EFBD438}"/>
               </a:ext>
             </a:extLst>
           </p:cNvPr>
@@ -8255,7 +8259,7 @@
             <p:cNvPr id="5" name="Picture 4">
               <a:extLst>
                 <a:ext uri="{FF2B5EF4-FFF2-40B4-BE49-F238E27FC236}">
-                  <a16:creationId xmlns="" xmlns:a16="http://schemas.microsoft.com/office/drawing/2014/main" id="{20EE73A0-299D-4E7F-A490-9719C6AC5308}"/>
+                  <a16:creationId xmlns:a16="http://schemas.microsoft.com/office/drawing/2014/main" xmlns="" id="{20EE73A0-299D-4E7F-A490-9719C6AC5308}"/>
                 </a:ext>
               </a:extLst>
             </p:cNvPr>
@@ -8285,7 +8289,7 @@
             <p:cNvPr id="6" name="Picture 5" descr="A picture containing text&#10;&#10;Description automatically generated">
               <a:extLst>
                 <a:ext uri="{FF2B5EF4-FFF2-40B4-BE49-F238E27FC236}">
-                  <a16:creationId xmlns="" xmlns:a16="http://schemas.microsoft.com/office/drawing/2014/main" id="{1476F098-749B-4C07-EA3A-C8916E8D36A4}"/>
+                  <a16:creationId xmlns:a16="http://schemas.microsoft.com/office/drawing/2014/main" xmlns="" id="{1476F098-749B-4C07-EA3A-C8916E8D36A4}"/>
                 </a:ext>
               </a:extLst>
             </p:cNvPr>
@@ -8453,7 +8457,7 @@
           <p:cNvPr id="4" name="Group 3">
             <a:extLst>
               <a:ext uri="{FF2B5EF4-FFF2-40B4-BE49-F238E27FC236}">
-                <a16:creationId xmlns="" xmlns:a16="http://schemas.microsoft.com/office/drawing/2014/main" id="{13F2DEE3-F449-38D9-9AB5-0EBC1EFBD438}"/>
+                <a16:creationId xmlns:a16="http://schemas.microsoft.com/office/drawing/2014/main" xmlns="" id="{13F2DEE3-F449-38D9-9AB5-0EBC1EFBD438}"/>
               </a:ext>
             </a:extLst>
           </p:cNvPr>
@@ -8473,7 +8477,7 @@
             <p:cNvPr id="5" name="Picture 4">
               <a:extLst>
                 <a:ext uri="{FF2B5EF4-FFF2-40B4-BE49-F238E27FC236}">
-                  <a16:creationId xmlns="" xmlns:a16="http://schemas.microsoft.com/office/drawing/2014/main" id="{20EE73A0-299D-4E7F-A490-9719C6AC5308}"/>
+                  <a16:creationId xmlns:a16="http://schemas.microsoft.com/office/drawing/2014/main" xmlns="" id="{20EE73A0-299D-4E7F-A490-9719C6AC5308}"/>
                 </a:ext>
               </a:extLst>
             </p:cNvPr>
@@ -8503,7 +8507,7 @@
             <p:cNvPr id="6" name="Picture 5" descr="A picture containing text&#10;&#10;Description automatically generated">
               <a:extLst>
                 <a:ext uri="{FF2B5EF4-FFF2-40B4-BE49-F238E27FC236}">
-                  <a16:creationId xmlns="" xmlns:a16="http://schemas.microsoft.com/office/drawing/2014/main" id="{1476F098-749B-4C07-EA3A-C8916E8D36A4}"/>
+                  <a16:creationId xmlns:a16="http://schemas.microsoft.com/office/drawing/2014/main" xmlns="" id="{1476F098-749B-4C07-EA3A-C8916E8D36A4}"/>
                 </a:ext>
               </a:extLst>
             </p:cNvPr>

</xml_diff>